<commit_message>
SCR 02 neue Lizenz eingepflegt
</commit_message>
<xml_diff>
--- a/training-cards/music moves/Scrum (SCR)/ger/apprentice/ger_SCR_02_Resonanz_finden_MM_A.pptx
+++ b/training-cards/music moves/Scrum (SCR)/ger/apprentice/ger_SCR_02_Resonanz_finden_MM_A.pptx
@@ -105,6 +105,22 @@
       </a:defRPr>
     </a:lvl9pPr>
   </p:defaultTextStyle>
+  <p:extLst>
+    <p:ext uri="{EFAFB233-063F-42B5-8137-9DF3F51BA10A}">
+      <p15:sldGuideLst xmlns:p15="http://schemas.microsoft.com/office/powerpoint/2012/main">
+        <p15:guide id="1" orient="horz" pos="872">
+          <p15:clr>
+            <a:srgbClr val="A4A3A4"/>
+          </p15:clr>
+        </p15:guide>
+        <p15:guide id="2" pos="735">
+          <p15:clr>
+            <a:srgbClr val="A4A3A4"/>
+          </p15:clr>
+        </p15:guide>
+      </p15:sldGuideLst>
+    </p:ext>
+  </p:extLst>
 </p:presentation>
 </file>
 
@@ -150,7 +166,7 @@
           </a:lstStyle>
           <a:p>
             <a:r>
-              <a:rPr lang="de-DE" smtClean="0"/>
+              <a:rPr lang="de-DE"/>
               <a:t>Mastertitelformat bearbeiten</a:t>
             </a:r>
             <a:endParaRPr lang="de-DE" dirty="0"/>
@@ -271,7 +287,7 @@
           </a:lstStyle>
           <a:p>
             <a:r>
-              <a:rPr lang="de-DE" smtClean="0"/>
+              <a:rPr lang="de-DE"/>
               <a:t>Master-Untertitelformat bearbeiten</a:t>
             </a:r>
             <a:endParaRPr lang="de-DE" dirty="0"/>
@@ -305,35 +321,35 @@
           <a:p>
             <a:pPr lvl="0"/>
             <a:r>
-              <a:rPr lang="de-DE" smtClean="0"/>
+              <a:rPr lang="de-DE"/>
               <a:t>Mastertextformat bearbeiten</a:t>
             </a:r>
           </a:p>
           <a:p>
             <a:pPr lvl="1"/>
             <a:r>
-              <a:rPr lang="de-DE" smtClean="0"/>
+              <a:rPr lang="de-DE"/>
               <a:t>Zweite Ebene</a:t>
             </a:r>
           </a:p>
           <a:p>
             <a:pPr lvl="2"/>
             <a:r>
-              <a:rPr lang="de-DE" smtClean="0"/>
+              <a:rPr lang="de-DE"/>
               <a:t>Dritte Ebene</a:t>
             </a:r>
           </a:p>
           <a:p>
             <a:pPr lvl="3"/>
             <a:r>
-              <a:rPr lang="de-DE" smtClean="0"/>
+              <a:rPr lang="de-DE"/>
               <a:t>Vierte Ebene</a:t>
             </a:r>
           </a:p>
           <a:p>
             <a:pPr lvl="4"/>
             <a:r>
-              <a:rPr lang="de-DE" smtClean="0"/>
+              <a:rPr lang="de-DE"/>
               <a:t>Fünfte Ebene</a:t>
             </a:r>
             <a:endParaRPr lang="de-DE" dirty="0"/>
@@ -449,35 +465,35 @@
           <a:p>
             <a:pPr lvl="0"/>
             <a:r>
-              <a:rPr lang="de-DE" smtClean="0"/>
+              <a:rPr lang="de-DE"/>
               <a:t>Mastertextformat bearbeiten</a:t>
             </a:r>
           </a:p>
           <a:p>
             <a:pPr lvl="1"/>
             <a:r>
-              <a:rPr lang="de-DE" smtClean="0"/>
+              <a:rPr lang="de-DE"/>
               <a:t>Zweite Ebene</a:t>
             </a:r>
           </a:p>
           <a:p>
             <a:pPr lvl="2"/>
             <a:r>
-              <a:rPr lang="de-DE" smtClean="0"/>
+              <a:rPr lang="de-DE"/>
               <a:t>Dritte Ebene</a:t>
             </a:r>
           </a:p>
           <a:p>
             <a:pPr lvl="3"/>
             <a:r>
-              <a:rPr lang="de-DE" smtClean="0"/>
+              <a:rPr lang="de-DE"/>
               <a:t>Vierte Ebene</a:t>
             </a:r>
           </a:p>
           <a:p>
             <a:pPr lvl="4"/>
             <a:r>
-              <a:rPr lang="de-DE" smtClean="0"/>
+              <a:rPr lang="de-DE"/>
               <a:t>Fünfte Ebene</a:t>
             </a:r>
             <a:endParaRPr lang="de-DE" dirty="0"/>
@@ -507,7 +523,7 @@
           <a:lstStyle/>
           <a:p>
             <a:r>
-              <a:rPr lang="de-DE" sz="2400" dirty="0" smtClean="0">
+              <a:rPr lang="de-DE" sz="2400" dirty="0">
                 <a:solidFill>
                   <a:srgbClr val="7E006B"/>
                 </a:solidFill>
@@ -517,7 +533,7 @@
               <a:t>TR	AININGS</a:t>
             </a:r>
             <a:r>
-              <a:rPr lang="de-DE" sz="2400" dirty="0" smtClean="0">
+              <a:rPr lang="de-DE" sz="2400" dirty="0">
                 <a:solidFill>
                   <a:srgbClr val="7E006B"/>
                 </a:solidFill>
@@ -612,10 +628,9 @@
           <a:lstStyle/>
           <a:p>
             <a:r>
-              <a:rPr lang="de-DE" smtClean="0"/>
+              <a:rPr lang="de-DE"/>
               <a:t>Mastertitelformat bearbeiten</a:t>
             </a:r>
-            <a:endParaRPr lang="de-DE"/>
           </a:p>
         </p:txBody>
       </p:sp>
@@ -636,7 +651,7 @@
           <a:p>
             <a:fld id="{FF5B2BAF-DF38-0A48-A798-0C06E514FD52}" type="datetimeFigureOut">
               <a:rPr lang="de-DE" smtClean="0"/>
-              <a:t>16.07.15</a:t>
+              <a:t>29.07.23</a:t>
             </a:fld>
             <a:endParaRPr lang="de-DE" dirty="0"/>
           </a:p>
@@ -747,17 +762,16 @@
           <a:p>
             <a:pPr marL="0" lvl="0" algn="l"/>
             <a:r>
-              <a:rPr lang="de-DE" dirty="0" smtClean="0"/>
+              <a:rPr lang="de-DE" dirty="0"/>
               <a:t>Überschrift </a:t>
             </a:r>
             <a:br>
-              <a:rPr lang="de-DE" dirty="0" smtClean="0"/>
+              <a:rPr lang="de-DE" dirty="0"/>
             </a:br>
             <a:r>
-              <a:rPr lang="de-DE" dirty="0" smtClean="0"/>
+              <a:rPr lang="de-DE" dirty="0"/>
               <a:t>bearbeiten </a:t>
             </a:r>
-            <a:endParaRPr lang="de-DE" dirty="0"/>
           </a:p>
         </p:txBody>
       </p:sp>
@@ -788,38 +802,37 @@
           <a:p>
             <a:pPr lvl="0"/>
             <a:r>
-              <a:rPr lang="de-DE" dirty="0" smtClean="0"/>
+              <a:rPr lang="de-DE" dirty="0"/>
               <a:t>Mastertextformat bearbeiten</a:t>
             </a:r>
           </a:p>
           <a:p>
             <a:pPr lvl="1"/>
             <a:r>
-              <a:rPr lang="de-DE" dirty="0" smtClean="0"/>
+              <a:rPr lang="de-DE" dirty="0"/>
               <a:t>Zweite Ebene</a:t>
             </a:r>
           </a:p>
           <a:p>
             <a:pPr lvl="2"/>
             <a:r>
-              <a:rPr lang="de-DE" dirty="0" smtClean="0"/>
+              <a:rPr lang="de-DE" dirty="0"/>
               <a:t>Dritte Ebene</a:t>
             </a:r>
           </a:p>
           <a:p>
             <a:pPr lvl="3"/>
             <a:r>
-              <a:rPr lang="de-DE" dirty="0" smtClean="0"/>
+              <a:rPr lang="de-DE" dirty="0"/>
               <a:t>Vierte Ebene</a:t>
             </a:r>
           </a:p>
           <a:p>
             <a:pPr lvl="4"/>
             <a:r>
-              <a:rPr lang="de-DE" dirty="0" smtClean="0"/>
+              <a:rPr lang="de-DE" dirty="0"/>
               <a:t>Fünfte Ebene</a:t>
             </a:r>
-            <a:endParaRPr lang="de-DE" dirty="0"/>
           </a:p>
         </p:txBody>
       </p:sp>
@@ -858,7 +871,7 @@
           <a:p>
             <a:fld id="{FF5B2BAF-DF38-0A48-A798-0C06E514FD52}" type="datetimeFigureOut">
               <a:rPr lang="de-DE" smtClean="0"/>
-              <a:t>16.07.15</a:t>
+              <a:t>29.07.23</a:t>
             </a:fld>
             <a:endParaRPr lang="de-DE" dirty="0"/>
           </a:p>
@@ -1092,7 +1105,7 @@
           <a:lstStyle/>
           <a:p>
             <a:r>
-              <a:rPr lang="de-DE" sz="1050" b="1" dirty="0" smtClean="0">
+              <a:rPr lang="de-DE" sz="1050" b="1" dirty="0">
                 <a:solidFill>
                   <a:schemeClr val="bg1"/>
                 </a:solidFill>
@@ -1102,7 +1115,7 @@
               <a:t>TRAININGSKARTE</a:t>
             </a:r>
             <a:r>
-              <a:rPr lang="de-DE" sz="1050" dirty="0" smtClean="0">
+              <a:rPr lang="de-DE" sz="1050" dirty="0">
                 <a:solidFill>
                   <a:schemeClr val="bg1"/>
                 </a:solidFill>
@@ -1112,7 +1125,7 @@
               <a:t> </a:t>
             </a:r>
             <a:r>
-              <a:rPr lang="de-DE" sz="1050" b="1" dirty="0" smtClean="0">
+              <a:rPr lang="de-DE" sz="1050" b="1" dirty="0">
                 <a:solidFill>
                   <a:schemeClr val="bg1"/>
                 </a:solidFill>
@@ -1121,13 +1134,6 @@
               </a:rPr>
               <a:t>SCR 02</a:t>
             </a:r>
-            <a:endParaRPr lang="de-DE" sz="1050" b="1" dirty="0">
-              <a:solidFill>
-                <a:schemeClr val="bg1"/>
-              </a:solidFill>
-              <a:latin typeface="Avenir Heavy"/>
-              <a:cs typeface="Avenir Heavy"/>
-            </a:endParaRPr>
           </a:p>
         </p:txBody>
       </p:sp>
@@ -1510,10 +1516,9 @@
           <a:lstStyle/>
           <a:p>
             <a:r>
-              <a:rPr lang="de-DE" dirty="0" smtClean="0"/>
+              <a:rPr lang="de-DE" dirty="0"/>
               <a:t>RESONANZ</a:t>
             </a:r>
-            <a:endParaRPr lang="de-DE" dirty="0"/>
           </a:p>
         </p:txBody>
       </p:sp>
@@ -1538,10 +1543,9 @@
           <a:lstStyle/>
           <a:p>
             <a:r>
-              <a:rPr lang="de-DE" dirty="0" smtClean="0"/>
+              <a:rPr lang="de-DE" dirty="0"/>
               <a:t>FINDEN</a:t>
             </a:r>
-            <a:endParaRPr lang="de-DE" dirty="0"/>
           </a:p>
         </p:txBody>
       </p:sp>
@@ -1582,153 +1586,35 @@
               <a:rPr lang="de-DE" dirty="0"/>
               <a:t>) ein Treffen, in dem sich das gesamte Team mit dem Kunden zusammensetzt um die verrichtete Arbeit zu zeigen, welche Probleme aufgetreten sind, wie sie gelöst wurden und die Ergebnisse des Sprints zu diskutieren (Was ist fertig geworden und was nicht?). </a:t>
             </a:r>
-            <a:endParaRPr lang="de-DE" dirty="0" smtClean="0"/>
           </a:p>
           <a:p>
             <a:r>
               <a:rPr lang="de-DE" dirty="0"/>
-              <a:t>Für </a:t>
-            </a:r>
-            <a:r>
-              <a:rPr lang="de-DE" dirty="0" smtClean="0"/>
-              <a:t>Dich als Musiker </a:t>
-            </a:r>
+              <a:t>Für Dich als Musiker könnte es ein Treffen sein, das Deine Musikerkollegen einschließt, die für Dich die Rolle eines Trainingspartners haben. Ebenso wären Lehrer oder interessierte Bekannte als ein potenzielles Publikum dabei willkommen.</a:t>
+            </a:r>
+          </a:p>
+          <a:p>
             <a:r>
               <a:rPr lang="de-DE" dirty="0"/>
-              <a:t>könnte es ein Treffen sein, das </a:t>
-            </a:r>
-            <a:r>
-              <a:rPr lang="de-DE" dirty="0" smtClean="0"/>
-              <a:t>Deine </a:t>
-            </a:r>
+              <a:t>Es ist kein Statusbericht, sondern ein aktives Einfordern von Austausch über das eigene Üben. Es geht hierbei um eine Diskussion auf Augenhöhe, darum gemeinsam Perspektiven aufzuwerfen, die Dich voranbringen.</a:t>
+            </a:r>
+          </a:p>
+          <a:p>
             <a:r>
               <a:rPr lang="de-DE" dirty="0"/>
-              <a:t>Musikerkollegen einschließt, die </a:t>
-            </a:r>
-            <a:r>
-              <a:rPr lang="de-DE" dirty="0" smtClean="0"/>
-              <a:t>für Dich die </a:t>
-            </a:r>
+              <a:t>Um das Zusammentreffen zu organisieren brauchst Du vorher eine Sprintplanung (SCR 05) und einen durchgeführten Sprint (SCR 01). </a:t>
+            </a:r>
+          </a:p>
+          <a:p>
             <a:r>
               <a:rPr lang="de-DE" dirty="0"/>
-              <a:t>Rolle eines Trainingspartners haben. Ebenso wären Lehrer oder interessierte Bekannte als ein potenzielles Publikum dabei willkommen</a:t>
-            </a:r>
-            <a:r>
-              <a:rPr lang="de-DE" dirty="0" smtClean="0"/>
-              <a:t>.</a:t>
-            </a:r>
-            <a:endParaRPr lang="de-DE" dirty="0"/>
+              <a:t>Du spielst Deine Ergebnisse vor, das heißt alle Phrasen, die Du "fertig" geübt hast (SCR 04). Wenn Du möchtest und es bereits möglich ist, kannst Du auch ganze Teile von Stücken oder fertige Stücke vorspielen, die die bearbeiteten Phrasen beinhalten. Halte dabei aber Deine Zuhörer auf dem Laufenden, welche die speziellen Phrasen sind, mit denen Du im letzten Sprint gearbeitet hast.</a:t>
+            </a:r>
           </a:p>
           <a:p>
             <a:r>
               <a:rPr lang="de-DE" dirty="0"/>
-              <a:t>Es ist kein Statusbericht, sondern ein aktives Einfordern von Austausch über das eigene </a:t>
-            </a:r>
-            <a:r>
-              <a:rPr lang="de-DE" dirty="0" smtClean="0"/>
-              <a:t>Üben. Es </a:t>
-            </a:r>
-            <a:r>
-              <a:rPr lang="de-DE" dirty="0"/>
-              <a:t>geht hierbei um </a:t>
-            </a:r>
-            <a:r>
-              <a:rPr lang="de-DE" dirty="0" smtClean="0"/>
-              <a:t>eine Diskussion auf </a:t>
-            </a:r>
-            <a:r>
-              <a:rPr lang="de-DE" dirty="0"/>
-              <a:t>Augenhöhe, darum gemeinsam Perspektiven aufzuwerfen, die </a:t>
-            </a:r>
-            <a:r>
-              <a:rPr lang="de-DE" dirty="0" smtClean="0"/>
-              <a:t>Dich voranbringen</a:t>
-            </a:r>
-            <a:r>
-              <a:rPr lang="de-DE" dirty="0"/>
-              <a:t>.</a:t>
-            </a:r>
-          </a:p>
-          <a:p>
-            <a:r>
-              <a:rPr lang="de-DE" dirty="0"/>
-              <a:t>Um </a:t>
-            </a:r>
-            <a:r>
-              <a:rPr lang="de-DE" dirty="0" smtClean="0"/>
-              <a:t>das Zusammentreffen </a:t>
-            </a:r>
-            <a:r>
-              <a:rPr lang="de-DE" dirty="0"/>
-              <a:t>zu organisieren brauchst Du vorher eine Sprintplanung (SCR </a:t>
-            </a:r>
-            <a:r>
-              <a:rPr lang="de-DE" dirty="0" smtClean="0"/>
-              <a:t>05) </a:t>
-            </a:r>
-            <a:r>
-              <a:rPr lang="de-DE" dirty="0"/>
-              <a:t>und einen durchgeführten Sprint (SCR </a:t>
-            </a:r>
-            <a:r>
-              <a:rPr lang="de-DE" dirty="0" smtClean="0"/>
-              <a:t>01)</a:t>
-            </a:r>
-            <a:r>
-              <a:rPr lang="de-DE" dirty="0"/>
-              <a:t>. </a:t>
-            </a:r>
-          </a:p>
-          <a:p>
-            <a:r>
-              <a:rPr lang="de-DE" dirty="0"/>
-              <a:t>Du spielst </a:t>
-            </a:r>
-            <a:r>
-              <a:rPr lang="de-DE" dirty="0" smtClean="0"/>
-              <a:t>Deine </a:t>
-            </a:r>
-            <a:r>
-              <a:rPr lang="de-DE" dirty="0"/>
-              <a:t>Ergebnisse vor, das heißt alle Phrasen, die </a:t>
-            </a:r>
-            <a:r>
-              <a:rPr lang="de-DE" dirty="0" smtClean="0"/>
-              <a:t>Du </a:t>
-            </a:r>
-            <a:r>
-              <a:rPr lang="de-DE" dirty="0"/>
-              <a:t>"fertig" geübt hast (SCR </a:t>
-            </a:r>
-            <a:r>
-              <a:rPr lang="de-DE" dirty="0" smtClean="0"/>
-              <a:t>04)</a:t>
-            </a:r>
-            <a:r>
-              <a:rPr lang="de-DE" dirty="0"/>
-              <a:t>. Wenn Du möchtest und es bereits möglich ist, kannst Du auch ganze Teile von Stücken oder fertige Stücke vorspielen, die die bearbeiteten Phrasen beinhalten. Halte dabei aber Deine Zuhörer auf dem Laufenden, welche die speziellen Phrasen sind, mit denen Du im letzten Sprint gearbeitet hast.</a:t>
-            </a:r>
-          </a:p>
-          <a:p>
-            <a:r>
-              <a:rPr lang="de-DE" dirty="0"/>
-              <a:t>Ebenso wird durch </a:t>
-            </a:r>
-            <a:r>
-              <a:rPr lang="de-DE" dirty="0" smtClean="0"/>
-              <a:t>Deinen </a:t>
-            </a:r>
-            <a:r>
-              <a:rPr lang="de-DE" dirty="0"/>
-              <a:t>Sprintplan offen gelegt wie </a:t>
-            </a:r>
-            <a:r>
-              <a:rPr lang="de-DE" dirty="0" smtClean="0"/>
-              <a:t>genau Du geübt hast, </a:t>
-            </a:r>
-            <a:r>
-              <a:rPr lang="de-DE" dirty="0"/>
-              <a:t>sodass der </a:t>
+              <a:t>Ebenso wird durch Deinen Sprintplan offen gelegt wie genau Du geübt hast, sodass der </a:t>
             </a:r>
             <a:r>
               <a:rPr lang="de-DE" dirty="0" err="1"/>
@@ -1736,51 +1622,7 @@
             </a:r>
             <a:r>
               <a:rPr lang="de-DE" dirty="0"/>
-              <a:t> selbst auch </a:t>
-            </a:r>
-            <a:r>
-              <a:rPr lang="de-DE" dirty="0" smtClean="0"/>
-              <a:t> </a:t>
-            </a:r>
-            <a:r>
-              <a:rPr lang="de-DE" dirty="0"/>
-              <a:t>Resonanz bekommen kann. Dies </a:t>
-            </a:r>
-            <a:r>
-              <a:rPr lang="de-DE" dirty="0" smtClean="0"/>
-              <a:t>kannst Du unterstützen, </a:t>
-            </a:r>
-            <a:r>
-              <a:rPr lang="de-DE" dirty="0"/>
-              <a:t>indem </a:t>
-            </a:r>
-            <a:r>
-              <a:rPr lang="de-DE" dirty="0" smtClean="0"/>
-              <a:t>Du </a:t>
-            </a:r>
-            <a:r>
-              <a:rPr lang="de-DE" dirty="0"/>
-              <a:t>von </a:t>
-            </a:r>
-            <a:r>
-              <a:rPr lang="de-DE" dirty="0" smtClean="0"/>
-              <a:t>Deinen </a:t>
-            </a:r>
-            <a:r>
-              <a:rPr lang="de-DE" dirty="0"/>
-              <a:t>Problemen beim Üben </a:t>
-            </a:r>
-            <a:r>
-              <a:rPr lang="de-DE" dirty="0" smtClean="0"/>
-              <a:t>berichtest, wie Du </a:t>
-            </a:r>
-            <a:r>
-              <a:rPr lang="de-DE" dirty="0"/>
-              <a:t>damit umgegangen </a:t>
-            </a:r>
-            <a:r>
-              <a:rPr lang="de-DE" dirty="0" smtClean="0"/>
-              <a:t>bist und wie Deine weitere </a:t>
+              <a:t> selbst auch  Resonanz bekommen kann. Dies kannst Du unterstützen, indem Du von Deinen Problemen beim Üben berichtest, wie Du damit umgegangen bist und wie Deine weitere </a:t>
             </a:r>
             <a:r>
               <a:rPr lang="de-DE" dirty="0" err="1"/>
@@ -1788,24 +1630,14 @@
             </a:r>
             <a:r>
               <a:rPr lang="de-DE" dirty="0"/>
-              <a:t> </a:t>
-            </a:r>
-            <a:r>
-              <a:rPr lang="de-DE" dirty="0" smtClean="0"/>
-              <a:t>aussieht.</a:t>
-            </a:r>
-            <a:endParaRPr lang="de-DE" dirty="0"/>
+              <a:t> aussieht.</a:t>
+            </a:r>
           </a:p>
           <a:p>
             <a:r>
               <a:rPr lang="de-DE" dirty="0"/>
-              <a:t>In einem musikalischen Team (Band, Ensemble etc.) kann das Review innerhalb des Teams stattfinden, indem die Phrasen gemeinsam durchgespielt werden und entweder die Sprints der Einzelnen oder der gemeinsame Sprint diskutiert </a:t>
-            </a:r>
-            <a:r>
-              <a:rPr lang="de-DE" dirty="0" smtClean="0"/>
-              <a:t>werden.</a:t>
-            </a:r>
-            <a:endParaRPr lang="de-DE" dirty="0"/>
+              <a:t>In einem musikalischen Team (Band, Ensemble etc.) kann das Review innerhalb des Teams stattfinden, indem die Phrasen gemeinsam durchgespielt werden und entweder die Sprints der Einzelnen oder der gemeinsame Sprint diskutiert werden.</a:t>
+            </a:r>
           </a:p>
         </p:txBody>
       </p:sp>
@@ -1850,7 +1682,7 @@
           <a:p>
             <a:pPr algn="l"/>
             <a:r>
-              <a:rPr lang="de-DE" sz="1000" dirty="0" smtClean="0">
+              <a:rPr lang="de-DE" sz="1000" dirty="0">
                 <a:solidFill>
                   <a:srgbClr val="5D5E5F"/>
                 </a:solidFill>
@@ -1860,7 +1692,7 @@
               <a:t>REGINA</a:t>
             </a:r>
             <a:r>
-              <a:rPr lang="de-DE" sz="1000" baseline="0" dirty="0" smtClean="0">
+              <a:rPr lang="de-DE" sz="1000" baseline="0" dirty="0">
                 <a:solidFill>
                   <a:srgbClr val="5D5E5F"/>
                 </a:solidFill>
@@ -1870,7 +1702,7 @@
               <a:t> BRANDHUBER</a:t>
             </a:r>
             <a:r>
-              <a:rPr lang="de-DE" sz="1000" dirty="0" smtClean="0">
+              <a:rPr lang="de-DE" sz="1000" dirty="0">
                 <a:solidFill>
                   <a:srgbClr val="5D5E5F"/>
                 </a:solidFill>
@@ -1879,13 +1711,6 @@
               </a:rPr>
               <a:t> </a:t>
             </a:r>
-            <a:endParaRPr lang="de-DE" sz="1000" dirty="0">
-              <a:solidFill>
-                <a:srgbClr val="5D5E5F"/>
-              </a:solidFill>
-              <a:latin typeface="Avenir Book"/>
-              <a:cs typeface="Avenir Book"/>
-            </a:endParaRPr>
           </a:p>
         </p:txBody>
       </p:sp>
@@ -1938,45 +1763,335 @@
               <a:rPr lang="de-DE" dirty="0"/>
               <a:t>Organisiere zwei Termine um Resonanz einzufordern. </a:t>
             </a:r>
-            <a:endParaRPr lang="de-DE" dirty="0" smtClean="0"/>
-          </a:p>
-          <a:p>
-            <a:r>
-              <a:rPr lang="de-DE" dirty="0" smtClean="0"/>
-              <a:t>Jeder </a:t>
-            </a:r>
+          </a:p>
+          <a:p>
             <a:r>
               <a:rPr lang="de-DE" dirty="0"/>
-              <a:t>Termin muss nach einem vollständigen Sprint stattfinden. </a:t>
-            </a:r>
-            <a:endParaRPr lang="de-DE" dirty="0" smtClean="0"/>
-          </a:p>
-          <a:p>
-            <a:r>
-              <a:rPr lang="de-DE" dirty="0" smtClean="0"/>
-              <a:t>Lade </a:t>
-            </a:r>
+              <a:t>Jeder Termin muss nach einem vollständigen Sprint stattfinden. </a:t>
+            </a:r>
+          </a:p>
+          <a:p>
             <a:r>
               <a:rPr lang="de-DE" dirty="0"/>
-              <a:t>Deine Trainingspartner, Lehrer und Bekannte zu einem gemeinsamen Treffen ein und führe das Sprint Review durch</a:t>
-            </a:r>
-            <a:r>
-              <a:rPr lang="de-DE" dirty="0" smtClean="0"/>
-              <a:t>. </a:t>
-            </a:r>
-          </a:p>
-          <a:p>
-            <a:r>
-              <a:rPr lang="de-DE" dirty="0" smtClean="0"/>
-              <a:t>Dokumentiere </a:t>
-            </a:r>
+              <a:t>Lade Deine Trainingspartner, Lehrer und Bekannte zu einem gemeinsamen Treffen ein und führe das Sprint Review durch. </a:t>
+            </a:r>
+          </a:p>
+          <a:p>
             <a:r>
               <a:rPr lang="de-DE" dirty="0"/>
-              <a:t>schriftlich alle Ergebnisse und lass Dir anhand dessen Deinen Move von Deinem Team durchwinken.</a:t>
+              <a:t>Dokumentiere schriftlich alle Ergebnisse und lass Dir anhand dessen Deinen Move von Deinem Team durchwinken.</a:t>
             </a:r>
           </a:p>
         </p:txBody>
       </p:sp>
+      <p:sp>
+        <p:nvSpPr>
+          <p:cNvPr id="3" name="Shape 7">
+            <a:extLst>
+              <a:ext uri="{FF2B5EF4-FFF2-40B4-BE49-F238E27FC236}">
+                <a16:creationId xmlns:a16="http://schemas.microsoft.com/office/drawing/2014/main" id="{B050A9ED-620E-29CA-C4C7-AFA51747A6AC}"/>
+              </a:ext>
+            </a:extLst>
+          </p:cNvPr>
+          <p:cNvSpPr/>
+          <p:nvPr/>
+        </p:nvSpPr>
+        <p:spPr>
+          <a:xfrm>
+            <a:off x="971550" y="4689585"/>
+            <a:ext cx="4691860" cy="461661"/>
+          </a:xfrm>
+          <a:prstGeom prst="rect">
+            <a:avLst/>
+          </a:prstGeom>
+          <a:ln w="12700">
+            <a:miter lim="400000"/>
+          </a:ln>
+          <a:extLst>
+            <a:ext uri="{C572A759-6A51-4108-AA02-DFA0A04FC94B}">
+              <ma14:wrappingTextBoxFlag xmlns:ma14="http://schemas.microsoft.com/office/mac/drawingml/2011/main" xmlns="" val="1"/>
+            </a:ext>
+          </a:extLst>
+        </p:spPr>
+        <p:txBody>
+          <a:bodyPr wrap="square" lIns="45718" tIns="45718" rIns="45718" bIns="45718">
+            <a:spAutoFit/>
+          </a:bodyPr>
+          <a:lstStyle/>
+          <a:p>
+            <a:pPr lvl="0" algn="ctr">
+              <a:defRPr sz="1800"/>
+            </a:pPr>
+            <a:r>
+              <a:rPr lang="de-DE" sz="800" b="0" i="0" u="none" strike="noStrike" dirty="0" err="1">
+                <a:solidFill>
+                  <a:schemeClr val="tx1">
+                    <a:lumMod val="65000"/>
+                    <a:lumOff val="35000"/>
+                  </a:schemeClr>
+                </a:solidFill>
+                <a:effectLst/>
+                <a:latin typeface="Avenir Book" panose="02000503020000020003" pitchFamily="2" charset="0"/>
+              </a:rPr>
+              <a:t>music</a:t>
+            </a:r>
+            <a:r>
+              <a:rPr lang="de-DE" sz="800" b="0" i="0" u="none" strike="noStrike" dirty="0">
+                <a:solidFill>
+                  <a:schemeClr val="tx1">
+                    <a:lumMod val="65000"/>
+                    <a:lumOff val="35000"/>
+                  </a:schemeClr>
+                </a:solidFill>
+                <a:effectLst/>
+                <a:latin typeface="Avenir Book" panose="02000503020000020003" pitchFamily="2" charset="0"/>
+              </a:rPr>
+              <a:t> </a:t>
+            </a:r>
+            <a:r>
+              <a:rPr lang="de-DE" sz="800" b="0" i="0" u="none" strike="noStrike" dirty="0" err="1">
+                <a:solidFill>
+                  <a:schemeClr val="tx1">
+                    <a:lumMod val="65000"/>
+                    <a:lumOff val="35000"/>
+                  </a:schemeClr>
+                </a:solidFill>
+                <a:effectLst/>
+                <a:latin typeface="Avenir Book" panose="02000503020000020003" pitchFamily="2" charset="0"/>
+              </a:rPr>
+              <a:t>moves</a:t>
+            </a:r>
+            <a:r>
+              <a:rPr lang="de-DE" sz="800" b="0" i="0" u="none" strike="noStrike" dirty="0">
+                <a:solidFill>
+                  <a:schemeClr val="tx1">
+                    <a:lumMod val="65000"/>
+                    <a:lumOff val="35000"/>
+                  </a:schemeClr>
+                </a:solidFill>
+                <a:effectLst/>
+                <a:latin typeface="Avenir Book" panose="02000503020000020003" pitchFamily="2" charset="0"/>
+              </a:rPr>
+              <a:t>-Trainingskarten von Regina Brandhuber sind lizenziert unter einer Creative Commons </a:t>
+            </a:r>
+          </a:p>
+          <a:p>
+            <a:pPr lvl="0" algn="ctr">
+              <a:defRPr sz="1800"/>
+            </a:pPr>
+            <a:r>
+              <a:rPr lang="de-DE" sz="800" b="0" i="0" u="none" strike="noStrike" dirty="0">
+                <a:solidFill>
+                  <a:schemeClr val="tx1">
+                    <a:lumMod val="65000"/>
+                    <a:lumOff val="35000"/>
+                  </a:schemeClr>
+                </a:solidFill>
+                <a:effectLst/>
+                <a:latin typeface="Avenir Book" panose="02000503020000020003" pitchFamily="2" charset="0"/>
+              </a:rPr>
+              <a:t>Namensnennung-Nicht kommerziell 4.0 International Lizenz.</a:t>
+            </a:r>
+          </a:p>
+          <a:p>
+            <a:pPr lvl="0" algn="ctr">
+              <a:defRPr sz="1800"/>
+            </a:pPr>
+            <a:r>
+              <a:rPr lang="de-DE" sz="800" dirty="0">
+                <a:solidFill>
+                  <a:schemeClr val="tx1">
+                    <a:lumMod val="65000"/>
+                    <a:lumOff val="35000"/>
+                  </a:schemeClr>
+                </a:solidFill>
+                <a:latin typeface="Avenir Book" panose="02000503020000020003" pitchFamily="2" charset="0"/>
+                <a:ea typeface="Calibri"/>
+                <a:cs typeface="Avenir Light"/>
+                <a:sym typeface="Calibri"/>
+              </a:rPr>
+              <a:t>Nachzulesen unter:</a:t>
+            </a:r>
+            <a:r>
+              <a:rPr sz="800" dirty="0">
+                <a:solidFill>
+                  <a:schemeClr val="tx1">
+                    <a:lumMod val="65000"/>
+                    <a:lumOff val="35000"/>
+                  </a:schemeClr>
+                </a:solidFill>
+                <a:latin typeface="Avenir Book" panose="02000503020000020003" pitchFamily="2" charset="0"/>
+                <a:ea typeface="Calibri"/>
+                <a:cs typeface="Avenir Light"/>
+                <a:sym typeface="Calibri"/>
+              </a:rPr>
+              <a:t> </a:t>
+            </a:r>
+            <a:r>
+              <a:rPr lang="de-DE" sz="800" dirty="0">
+                <a:solidFill>
+                  <a:schemeClr val="tx1">
+                    <a:lumMod val="65000"/>
+                    <a:lumOff val="35000"/>
+                  </a:schemeClr>
+                </a:solidFill>
+                <a:latin typeface="Avenir Book" panose="02000503020000020003" pitchFamily="2" charset="0"/>
+                <a:ea typeface="Calibri"/>
+                <a:cs typeface="Avenir Light"/>
+                <a:sym typeface="Calibri"/>
+              </a:rPr>
+              <a:t>https://</a:t>
+            </a:r>
+            <a:r>
+              <a:rPr lang="de-DE" sz="800" dirty="0" err="1">
+                <a:solidFill>
+                  <a:schemeClr val="tx1">
+                    <a:lumMod val="65000"/>
+                    <a:lumOff val="35000"/>
+                  </a:schemeClr>
+                </a:solidFill>
+                <a:latin typeface="Avenir Book" panose="02000503020000020003" pitchFamily="2" charset="0"/>
+                <a:ea typeface="Calibri"/>
+                <a:cs typeface="Avenir Light"/>
+                <a:sym typeface="Calibri"/>
+              </a:rPr>
+              <a:t>creativecommons.org</a:t>
+            </a:r>
+            <a:r>
+              <a:rPr lang="de-DE" sz="800" dirty="0">
+                <a:solidFill>
+                  <a:schemeClr val="tx1">
+                    <a:lumMod val="65000"/>
+                    <a:lumOff val="35000"/>
+                  </a:schemeClr>
+                </a:solidFill>
+                <a:latin typeface="Avenir Book" panose="02000503020000020003" pitchFamily="2" charset="0"/>
+                <a:ea typeface="Calibri"/>
+                <a:cs typeface="Avenir Light"/>
+                <a:sym typeface="Calibri"/>
+              </a:rPr>
+              <a:t>/</a:t>
+            </a:r>
+            <a:r>
+              <a:rPr lang="de-DE" sz="800" dirty="0" err="1">
+                <a:solidFill>
+                  <a:schemeClr val="tx1">
+                    <a:lumMod val="65000"/>
+                    <a:lumOff val="35000"/>
+                  </a:schemeClr>
+                </a:solidFill>
+                <a:latin typeface="Avenir Book" panose="02000503020000020003" pitchFamily="2" charset="0"/>
+                <a:ea typeface="Calibri"/>
+                <a:cs typeface="Avenir Light"/>
+                <a:sym typeface="Calibri"/>
+              </a:rPr>
+              <a:t>licenses</a:t>
+            </a:r>
+            <a:r>
+              <a:rPr lang="de-DE" sz="800" dirty="0">
+                <a:solidFill>
+                  <a:schemeClr val="tx1">
+                    <a:lumMod val="65000"/>
+                    <a:lumOff val="35000"/>
+                  </a:schemeClr>
+                </a:solidFill>
+                <a:latin typeface="Avenir Book" panose="02000503020000020003" pitchFamily="2" charset="0"/>
+                <a:ea typeface="Calibri"/>
+                <a:cs typeface="Avenir Light"/>
+                <a:sym typeface="Calibri"/>
+              </a:rPr>
+              <a:t>/</a:t>
+            </a:r>
+            <a:r>
+              <a:rPr lang="de-DE" sz="800" dirty="0" err="1">
+                <a:solidFill>
+                  <a:schemeClr val="tx1">
+                    <a:lumMod val="65000"/>
+                    <a:lumOff val="35000"/>
+                  </a:schemeClr>
+                </a:solidFill>
+                <a:latin typeface="Avenir Book" panose="02000503020000020003" pitchFamily="2" charset="0"/>
+                <a:ea typeface="Calibri"/>
+                <a:cs typeface="Avenir Light"/>
+                <a:sym typeface="Calibri"/>
+              </a:rPr>
+              <a:t>by-nc</a:t>
+            </a:r>
+            <a:r>
+              <a:rPr lang="de-DE" sz="800" dirty="0">
+                <a:solidFill>
+                  <a:schemeClr val="tx1">
+                    <a:lumMod val="65000"/>
+                    <a:lumOff val="35000"/>
+                  </a:schemeClr>
+                </a:solidFill>
+                <a:latin typeface="Avenir Book" panose="02000503020000020003" pitchFamily="2" charset="0"/>
+                <a:ea typeface="Calibri"/>
+                <a:cs typeface="Avenir Light"/>
+                <a:sym typeface="Calibri"/>
+              </a:rPr>
+              <a:t>/4.0/</a:t>
+            </a:r>
+            <a:r>
+              <a:rPr lang="de-DE" sz="800" dirty="0" err="1">
+                <a:solidFill>
+                  <a:schemeClr val="tx1">
+                    <a:lumMod val="65000"/>
+                    <a:lumOff val="35000"/>
+                  </a:schemeClr>
+                </a:solidFill>
+                <a:latin typeface="Avenir Book" panose="02000503020000020003" pitchFamily="2" charset="0"/>
+                <a:ea typeface="Calibri"/>
+                <a:cs typeface="Avenir Light"/>
+                <a:sym typeface="Calibri"/>
+              </a:rPr>
+              <a:t>deed.de</a:t>
+            </a:r>
+            <a:endParaRPr sz="800" dirty="0">
+              <a:solidFill>
+                <a:schemeClr val="tx1">
+                  <a:lumMod val="65000"/>
+                  <a:lumOff val="35000"/>
+                </a:schemeClr>
+              </a:solidFill>
+              <a:latin typeface="Avenir Book" panose="02000503020000020003" pitchFamily="2" charset="0"/>
+              <a:ea typeface="Calibri"/>
+              <a:cs typeface="Avenir Light"/>
+              <a:sym typeface="Calibri"/>
+            </a:endParaRPr>
+          </a:p>
+        </p:txBody>
+      </p:sp>
+      <p:pic>
+        <p:nvPicPr>
+          <p:cNvPr id="4" name="pasted-image.tif">
+            <a:extLst>
+              <a:ext uri="{FF2B5EF4-FFF2-40B4-BE49-F238E27FC236}">
+                <a16:creationId xmlns:a16="http://schemas.microsoft.com/office/drawing/2014/main" id="{BA550199-C6FE-2924-9DD8-8459C3DEE449}"/>
+              </a:ext>
+            </a:extLst>
+          </p:cNvPr>
+          <p:cNvPicPr/>
+          <p:nvPr/>
+        </p:nvPicPr>
+        <p:blipFill rotWithShape="1">
+          <a:blip r:embed="rId2"/>
+          <a:srcRect r="24777" b="-3233"/>
+          <a:stretch/>
+        </p:blipFill>
+        <p:spPr>
+          <a:xfrm>
+            <a:off x="5724347" y="4733926"/>
+            <a:ext cx="1009828" cy="333374"/>
+          </a:xfrm>
+          <a:prstGeom prst="rect">
+            <a:avLst/>
+          </a:prstGeom>
+          <a:ln w="12700">
+            <a:miter lim="400000"/>
+          </a:ln>
+        </p:spPr>
+      </p:pic>
     </p:spTree>
     <p:extLst>
       <p:ext uri="{BB962C8B-B14F-4D97-AF65-F5344CB8AC3E}">

</xml_diff>

<commit_message>
SCR 02 Blocksatz und Quellen
</commit_message>
<xml_diff>
--- a/training-cards/music moves/Scrum (SCR)/ger/apprentice/ger_SCR_02_Resonanz_finden_MM_A.pptx
+++ b/training-cards/music moves/Scrum (SCR)/ger/apprentice/ger_SCR_02_Resonanz_finden_MM_A.pptx
@@ -651,7 +651,7 @@
           <a:p>
             <a:fld id="{FF5B2BAF-DF38-0A48-A798-0C06E514FD52}" type="datetimeFigureOut">
               <a:rPr lang="de-DE" smtClean="0"/>
-              <a:t>29.07.23</a:t>
+              <a:t>01.08.24</a:t>
             </a:fld>
             <a:endParaRPr lang="de-DE" dirty="0"/>
           </a:p>
@@ -871,7 +871,7 @@
           <a:p>
             <a:fld id="{FF5B2BAF-DF38-0A48-A798-0C06E514FD52}" type="datetimeFigureOut">
               <a:rPr lang="de-DE" smtClean="0"/>
-              <a:t>29.07.23</a:t>
+              <a:t>01.08.24</a:t>
             </a:fld>
             <a:endParaRPr lang="de-DE" dirty="0"/>
           </a:p>
@@ -1559,85 +1559,133 @@
             <p:ph idx="13"/>
           </p:nvPr>
         </p:nvSpPr>
-        <p:spPr/>
+        <p:spPr>
+          <a:xfrm>
+            <a:off x="858838" y="1568453"/>
+            <a:ext cx="6225356" cy="3292306"/>
+          </a:xfrm>
+        </p:spPr>
         <p:txBody>
           <a:bodyPr>
-            <a:normAutofit fontScale="92500"/>
+            <a:normAutofit fontScale="85000" lnSpcReduction="10000"/>
           </a:bodyPr>
           <a:lstStyle/>
           <a:p>
-            <a:r>
-              <a:rPr lang="de-DE" dirty="0"/>
-              <a:t>Das "Sprint Review" ist im Softwareframework </a:t>
-            </a:r>
-            <a:r>
-              <a:rPr lang="de-DE" dirty="0" err="1"/>
+            <a:pPr algn="just"/>
+            <a:r>
+              <a:rPr lang="de-DE" sz="1200" dirty="0"/>
+              <a:t>Das "Sprint Review“ </a:t>
+            </a:r>
+            <a:r>
+              <a:rPr lang="de-DE" sz="1200" dirty="0">
+                <a:solidFill>
+                  <a:srgbClr val="747982"/>
+                </a:solidFill>
+                <a:latin typeface="Avenir Book"/>
+                <a:cs typeface="Avenir Book"/>
+              </a:rPr>
+              <a:t>(</a:t>
+            </a:r>
+            <a:r>
+              <a:rPr lang="de-DE" sz="1200" dirty="0" err="1">
+                <a:solidFill>
+                  <a:srgbClr val="747982"/>
+                </a:solidFill>
+                <a:latin typeface="Avenir Book"/>
+                <a:cs typeface="Avenir Book"/>
+              </a:rPr>
+              <a:t>Schwaber</a:t>
+            </a:r>
+            <a:r>
+              <a:rPr lang="de-DE" sz="1200" dirty="0">
+                <a:solidFill>
+                  <a:srgbClr val="747982"/>
+                </a:solidFill>
+                <a:latin typeface="Avenir Book"/>
+                <a:cs typeface="Avenir Book"/>
+              </a:rPr>
+              <a:t>/Sutherland 2020, S. 10)</a:t>
+            </a:r>
+            <a:r>
+              <a:rPr lang="de-DE" sz="1200" dirty="0"/>
+              <a:t> ist im Softwareframework </a:t>
+            </a:r>
+            <a:r>
+              <a:rPr lang="de-DE" sz="1200" dirty="0" err="1"/>
               <a:t>Scrum</a:t>
             </a:r>
             <a:r>
-              <a:rPr lang="de-DE" dirty="0"/>
-              <a:t> (</a:t>
-            </a:r>
-            <a:r>
-              <a:rPr lang="de-DE" dirty="0" err="1"/>
-              <a:t>scrum.org</a:t>
-            </a:r>
-            <a:r>
-              <a:rPr lang="de-DE" dirty="0"/>
-              <a:t>) ein Treffen, in dem sich das gesamte Team mit dem Kunden zusammensetzt um die verrichtete Arbeit zu zeigen, welche Probleme aufgetreten sind, wie sie gelöst wurden und die Ergebnisse des Sprints zu diskutieren (Was ist fertig geworden und was nicht?). </a:t>
-            </a:r>
-          </a:p>
-          <a:p>
-            <a:r>
-              <a:rPr lang="de-DE" dirty="0"/>
-              <a:t>Für Dich als Musiker könnte es ein Treffen sein, das Deine Musikerkollegen einschließt, die für Dich die Rolle eines Trainingspartners haben. Ebenso wären Lehrer oder interessierte Bekannte als ein potenzielles Publikum dabei willkommen.</a:t>
-            </a:r>
-          </a:p>
-          <a:p>
-            <a:r>
-              <a:rPr lang="de-DE" dirty="0"/>
+              <a:rPr lang="de-DE" sz="1200" dirty="0"/>
+              <a:t> ein Treffen, in dem sich das gesamte Team mit dem Kunden zusammensetzt um die verrichtete Arbeit zu überprüfen, und die Veränderungen im Umfeld zu besprechen (vgl. ebd., S. 10). </a:t>
+            </a:r>
+          </a:p>
+          <a:p>
+            <a:pPr algn="just"/>
+            <a:r>
+              <a:rPr lang="de-DE" sz="1200" dirty="0"/>
+              <a:t>Für Dich als Musiker*in könnte es ein Treffen sein, das Deine Trainingspartner einschließt. Ebenso wären Lehrer*innen oder interessierte Bekannte willkommene Teilnehmer*innen.</a:t>
+            </a:r>
+          </a:p>
+          <a:p>
+            <a:pPr algn="just"/>
+            <a:r>
+              <a:rPr lang="de-DE" sz="1200" dirty="0"/>
               <a:t>Es ist kein Statusbericht, sondern ein aktives Einfordern von Austausch über das eigene Üben. Es geht hierbei um eine Diskussion auf Augenhöhe, darum gemeinsam Perspektiven aufzuwerfen, die Dich voranbringen.</a:t>
             </a:r>
           </a:p>
           <a:p>
-            <a:r>
-              <a:rPr lang="de-DE" dirty="0"/>
-              <a:t>Um das Zusammentreffen zu organisieren brauchst Du vorher eine Sprintplanung (SCR 05) und einen durchgeführten Sprint (SCR 01). </a:t>
-            </a:r>
-          </a:p>
-          <a:p>
-            <a:r>
-              <a:rPr lang="de-DE" dirty="0"/>
-              <a:t>Du spielst Deine Ergebnisse vor, das heißt alle Phrasen, die Du "fertig" geübt hast (SCR 04). Wenn Du möchtest und es bereits möglich ist, kannst Du auch ganze Teile von Stücken oder fertige Stücke vorspielen, die die bearbeiteten Phrasen beinhalten. Halte dabei aber Deine Zuhörer auf dem Laufenden, welche die speziellen Phrasen sind, mit denen Du im letzten Sprint gearbeitet hast.</a:t>
-            </a:r>
-          </a:p>
-          <a:p>
-            <a:r>
-              <a:rPr lang="de-DE" dirty="0"/>
-              <a:t>Ebenso wird durch Deinen Sprintplan offen gelegt wie genau Du geübt hast, sodass der </a:t>
-            </a:r>
-            <a:r>
-              <a:rPr lang="de-DE" dirty="0" err="1"/>
+            <a:pPr algn="just"/>
+            <a:r>
+              <a:rPr lang="de-DE" sz="1200" dirty="0"/>
+              <a:t>Um das Zusammentreffen zu organisieren, brauchst Du vorher eine Sprintplanung (SCR 05) und einen durchgeführten Sprint (SCR 01). </a:t>
+            </a:r>
+          </a:p>
+          <a:p>
+            <a:pPr algn="just"/>
+            <a:r>
+              <a:rPr lang="de-DE" sz="1200" dirty="0"/>
+              <a:t>Du zeigst Deine Ergebnisse, indem Du sie z.B. vorspielst. Genauso kannst Du Dein Phrasendiagramm zeigen oder alle Phrasen, die Du "fertig" geübt hast (SCR 04). Wenn Du möchtest und es bereits möglich ist, kannst Du auch ganze Teile von Stücken oder fertige Stücke vorspielen, die die bearbeiteten Phrasen beinhalten. Halte dabei aber Deine Zuhörer auf dem Laufenden, welche die speziellen Phrasen sind, mit denen Du im letzten Sprint gearbeitet hast.</a:t>
+            </a:r>
+          </a:p>
+          <a:p>
+            <a:pPr algn="just"/>
+            <a:r>
+              <a:rPr lang="de-DE" sz="1200" dirty="0"/>
+              <a:t>Ebenso wird durch Deinen Sprintplan offengelegt wie genau Du geübt hast, sodass der </a:t>
+            </a:r>
+            <a:r>
+              <a:rPr lang="de-DE" sz="1200" dirty="0" err="1"/>
               <a:t>Übeprozess</a:t>
             </a:r>
             <a:r>
-              <a:rPr lang="de-DE" dirty="0"/>
-              <a:t> selbst auch  Resonanz bekommen kann. Dies kannst Du unterstützen, indem Du von Deinen Problemen beim Üben berichtest, wie Du damit umgegangen bist und wie Deine weitere </a:t>
-            </a:r>
-            <a:r>
-              <a:rPr lang="de-DE" dirty="0" err="1"/>
-              <a:t>Übeplanung</a:t>
-            </a:r>
-            <a:r>
-              <a:rPr lang="de-DE" dirty="0"/>
-              <a:t> aussieht.</a:t>
-            </a:r>
-          </a:p>
-          <a:p>
-            <a:r>
-              <a:rPr lang="de-DE" dirty="0"/>
-              <a:t>In einem musikalischen Team (Band, Ensemble etc.) kann das Review innerhalb des Teams stattfinden, indem die Phrasen gemeinsam durchgespielt werden und entweder die Sprints der Einzelnen oder der gemeinsame Sprint diskutiert werden.</a:t>
-            </a:r>
+              <a:rPr lang="de-DE" sz="1200" dirty="0"/>
+              <a:t> selbst auch  Resonanz bekommen kann. Dies kannst Du unterstützen, indem Du von Deinen Problemen beim Üben berichtest, wie Du damit umgegangen bist und was du verändert hast.</a:t>
+            </a:r>
+          </a:p>
+          <a:p>
+            <a:pPr algn="just"/>
+            <a:r>
+              <a:rPr lang="de-DE" sz="1200" dirty="0"/>
+              <a:t>In einem musikalischen Team (Band, Ensemble etc.) kann das Review innerhalb des Teams stattfinden, indem die Phrasen gemeinsam durchgespielt oder z.B. aufgenommen werden, und entweder die Sprints der Einzelnen oder der gemeinsame Sprint diskutiert werden.</a:t>
+            </a:r>
+          </a:p>
+          <a:p>
+            <a:pPr lvl="0" algn="just">
+              <a:buSzPct val="170000"/>
+            </a:pPr>
+            <a:endParaRPr lang="de-DE" sz="900" dirty="0">
+              <a:solidFill>
+                <a:srgbClr val="747982"/>
+              </a:solidFill>
+              <a:latin typeface="Avenir Book"/>
+              <a:cs typeface="Avenir Book"/>
+            </a:endParaRPr>
+          </a:p>
+          <a:p>
+            <a:pPr marL="0" indent="0" algn="just">
+              <a:buNone/>
+            </a:pPr>
+            <a:endParaRPr lang="de-DE" dirty="0"/>
           </a:p>
         </p:txBody>
       </p:sp>
@@ -1711,6 +1759,214 @@
               </a:rPr>
               <a:t> </a:t>
             </a:r>
+          </a:p>
+        </p:txBody>
+      </p:sp>
+      <p:sp>
+        <p:nvSpPr>
+          <p:cNvPr id="2" name="Textfeld 1">
+            <a:extLst>
+              <a:ext uri="{FF2B5EF4-FFF2-40B4-BE49-F238E27FC236}">
+                <a16:creationId xmlns:a16="http://schemas.microsoft.com/office/drawing/2014/main" id="{E6A7668E-4CBF-0960-33A9-FF44442D128E}"/>
+              </a:ext>
+            </a:extLst>
+          </p:cNvPr>
+          <p:cNvSpPr txBox="1"/>
+          <p:nvPr/>
+        </p:nvSpPr>
+        <p:spPr>
+          <a:xfrm>
+            <a:off x="858838" y="4655551"/>
+            <a:ext cx="6131293" cy="707886"/>
+          </a:xfrm>
+          <a:prstGeom prst="rect">
+            <a:avLst/>
+          </a:prstGeom>
+          <a:noFill/>
+        </p:spPr>
+        <p:txBody>
+          <a:bodyPr wrap="square" rtlCol="0">
+            <a:spAutoFit/>
+          </a:bodyPr>
+          <a:lstStyle/>
+          <a:p>
+            <a:pPr marL="0" indent="0">
+              <a:buSzPct val="170000"/>
+              <a:buNone/>
+            </a:pPr>
+            <a:endParaRPr lang="de-DE" sz="800" b="1" dirty="0">
+              <a:solidFill>
+                <a:schemeClr val="tx1">
+                  <a:lumMod val="65000"/>
+                  <a:lumOff val="35000"/>
+                </a:schemeClr>
+              </a:solidFill>
+            </a:endParaRPr>
+          </a:p>
+          <a:p>
+            <a:pPr marL="0" indent="0">
+              <a:buSzPct val="170000"/>
+              <a:buNone/>
+            </a:pPr>
+            <a:endParaRPr lang="de-DE" sz="800" b="1" dirty="0">
+              <a:solidFill>
+                <a:schemeClr val="tx1">
+                  <a:lumMod val="65000"/>
+                  <a:lumOff val="35000"/>
+                </a:schemeClr>
+              </a:solidFill>
+            </a:endParaRPr>
+          </a:p>
+          <a:p>
+            <a:pPr marL="0" indent="0">
+              <a:buSzPct val="170000"/>
+              <a:buNone/>
+            </a:pPr>
+            <a:r>
+              <a:rPr lang="de-DE" sz="800" b="1" dirty="0">
+                <a:solidFill>
+                  <a:schemeClr val="tx1">
+                    <a:lumMod val="65000"/>
+                    <a:lumOff val="35000"/>
+                  </a:schemeClr>
+                </a:solidFill>
+              </a:rPr>
+              <a:t>Quelle: </a:t>
+            </a:r>
+            <a:r>
+              <a:rPr lang="de-DE" sz="800" b="1" dirty="0" err="1">
+                <a:solidFill>
+                  <a:schemeClr val="tx1">
+                    <a:lumMod val="65000"/>
+                    <a:lumOff val="35000"/>
+                  </a:schemeClr>
+                </a:solidFill>
+              </a:rPr>
+              <a:t>Schwaber</a:t>
+            </a:r>
+            <a:r>
+              <a:rPr lang="de-DE" sz="800" dirty="0">
+                <a:solidFill>
+                  <a:schemeClr val="tx1">
+                    <a:lumMod val="65000"/>
+                    <a:lumOff val="35000"/>
+                  </a:schemeClr>
+                </a:solidFill>
+              </a:rPr>
+              <a:t>, Ken/Sutherland, Jeff (2020): Der </a:t>
+            </a:r>
+            <a:r>
+              <a:rPr lang="de-DE" sz="800" dirty="0" err="1">
+                <a:solidFill>
+                  <a:schemeClr val="tx1">
+                    <a:lumMod val="65000"/>
+                    <a:lumOff val="35000"/>
+                  </a:schemeClr>
+                </a:solidFill>
+              </a:rPr>
+              <a:t>Scrum</a:t>
+            </a:r>
+            <a:r>
+              <a:rPr lang="de-DE" sz="800" dirty="0">
+                <a:solidFill>
+                  <a:schemeClr val="tx1">
+                    <a:lumMod val="65000"/>
+                    <a:lumOff val="35000"/>
+                  </a:schemeClr>
+                </a:solidFill>
+              </a:rPr>
+              <a:t> Guide. Der gültige Leitfaden für </a:t>
+            </a:r>
+            <a:r>
+              <a:rPr lang="de-DE" sz="800" dirty="0" err="1">
+                <a:solidFill>
+                  <a:schemeClr val="tx1">
+                    <a:lumMod val="65000"/>
+                    <a:lumOff val="35000"/>
+                  </a:schemeClr>
+                </a:solidFill>
+              </a:rPr>
+              <a:t>Scrum</a:t>
+            </a:r>
+            <a:r>
+              <a:rPr lang="de-DE" sz="800" dirty="0">
+                <a:solidFill>
+                  <a:schemeClr val="tx1">
+                    <a:lumMod val="65000"/>
+                    <a:lumOff val="35000"/>
+                  </a:schemeClr>
+                </a:solidFill>
+              </a:rPr>
+              <a:t>: Die </a:t>
+            </a:r>
+            <a:r>
+              <a:rPr lang="de-DE" sz="800" dirty="0" err="1">
+                <a:solidFill>
+                  <a:schemeClr val="tx1">
+                    <a:lumMod val="65000"/>
+                    <a:lumOff val="35000"/>
+                  </a:schemeClr>
+                </a:solidFill>
+              </a:rPr>
+              <a:t>Spielregeln.http</a:t>
+            </a:r>
+            <a:r>
+              <a:rPr lang="de-DE" sz="800" dirty="0">
+                <a:solidFill>
+                  <a:schemeClr val="tx1">
+                    <a:lumMod val="65000"/>
+                    <a:lumOff val="35000"/>
+                  </a:schemeClr>
+                </a:solidFill>
+              </a:rPr>
+              <a:t>://scrumguides.org/docs/ </a:t>
+            </a:r>
+            <a:br>
+              <a:rPr lang="de-DE" sz="800" dirty="0">
+                <a:solidFill>
+                  <a:schemeClr val="tx1">
+                    <a:lumMod val="65000"/>
+                    <a:lumOff val="35000"/>
+                  </a:schemeClr>
+                </a:solidFill>
+              </a:rPr>
+            </a:br>
+            <a:r>
+              <a:rPr lang="de-DE" sz="800" dirty="0">
+                <a:solidFill>
+                  <a:schemeClr val="tx1">
+                    <a:lumMod val="65000"/>
+                    <a:lumOff val="35000"/>
+                  </a:schemeClr>
+                </a:solidFill>
+              </a:rPr>
+              <a:t> 	</a:t>
+            </a:r>
+            <a:r>
+              <a:rPr lang="de-DE" sz="800" dirty="0" err="1">
+                <a:solidFill>
+                  <a:schemeClr val="tx1">
+                    <a:lumMod val="65000"/>
+                    <a:lumOff val="35000"/>
+                  </a:schemeClr>
+                </a:solidFill>
+              </a:rPr>
+              <a:t>scrumguide</a:t>
+            </a:r>
+            <a:r>
+              <a:rPr lang="de-DE" sz="800" dirty="0">
+                <a:solidFill>
+                  <a:schemeClr val="tx1">
+                    <a:lumMod val="65000"/>
+                    <a:lumOff val="35000"/>
+                  </a:schemeClr>
+                </a:solidFill>
+              </a:rPr>
+              <a:t>/v2020/2020-Scrum-Guide-German.pdf. Abgerufen am 25. Juli 2024</a:t>
+            </a:r>
+          </a:p>
+          <a:p>
+            <a:endParaRPr lang="de-DE" sz="800" dirty="0"/>
           </a:p>
         </p:txBody>
       </p:sp>
@@ -1756,31 +2012,42 @@
         </p:nvSpPr>
         <p:spPr/>
         <p:txBody>
-          <a:bodyPr/>
+          <a:bodyPr>
+            <a:normAutofit/>
+          </a:bodyPr>
           <a:lstStyle/>
           <a:p>
-            <a:r>
-              <a:rPr lang="de-DE" dirty="0"/>
+            <a:pPr algn="just"/>
+            <a:r>
+              <a:rPr lang="de-DE" sz="1200" dirty="0"/>
               <a:t>Organisiere zwei Termine um Resonanz einzufordern. </a:t>
             </a:r>
           </a:p>
           <a:p>
-            <a:r>
-              <a:rPr lang="de-DE" dirty="0"/>
-              <a:t>Jeder Termin muss nach einem vollständigen Sprint stattfinden. </a:t>
-            </a:r>
-          </a:p>
-          <a:p>
-            <a:r>
-              <a:rPr lang="de-DE" dirty="0"/>
-              <a:t>Lade Deine Trainingspartner, Lehrer und Bekannte zu einem gemeinsamen Treffen ein und führe das Sprint Review durch. </a:t>
-            </a:r>
-          </a:p>
-          <a:p>
-            <a:r>
-              <a:rPr lang="de-DE" dirty="0"/>
-              <a:t>Dokumentiere schriftlich alle Ergebnisse und lass Dir anhand dessen Deinen Move von Deinem Team durchwinken.</a:t>
-            </a:r>
+            <a:pPr algn="just"/>
+            <a:r>
+              <a:rPr lang="de-DE" sz="1200" dirty="0"/>
+              <a:t>Die Termine können nach einem vollständigen Sprint stattfinden. </a:t>
+            </a:r>
+          </a:p>
+          <a:p>
+            <a:pPr algn="just"/>
+            <a:r>
+              <a:rPr lang="de-DE" sz="1200" dirty="0"/>
+              <a:t>Lade Deine Trainingspartner*innen, Lehrer*innen und Bekannte zu einem gemeinsamen Treffen ein und führe das Sprint Review durch. </a:t>
+            </a:r>
+          </a:p>
+          <a:p>
+            <a:pPr algn="just"/>
+            <a:r>
+              <a:rPr lang="de-DE" sz="1200" dirty="0"/>
+              <a:t>Dokumentiere schriftlich alle Ergebnisse und lass Dir anhand dessen Deinen Move von Deinem </a:t>
+            </a:r>
+            <a:r>
+              <a:rPr lang="de-DE" sz="1200"/>
+              <a:t>Team zertifizieren.</a:t>
+            </a:r>
+            <a:endParaRPr lang="de-DE" sz="1200" dirty="0"/>
           </a:p>
         </p:txBody>
       </p:sp>
@@ -1809,7 +2076,7 @@
           </a:ln>
           <a:extLst>
             <a:ext uri="{C572A759-6A51-4108-AA02-DFA0A04FC94B}">
-              <ma14:wrappingTextBoxFlag xmlns:ma14="http://schemas.microsoft.com/office/mac/drawingml/2011/main" xmlns="" val="1"/>
+              <ma14:wrappingTextBoxFlag xmlns="" xmlns:ma14="http://schemas.microsoft.com/office/mac/drawingml/2011/main" val="1"/>
             </a:ext>
           </a:extLst>
         </p:spPr>

</xml_diff>